<commit_message>
Add final edits to slides
</commit_message>
<xml_diff>
--- a/vegaspy_pytest.pptx
+++ b/vegaspy_pytest.pptx
@@ -16,8 +16,8 @@
     <p:sldId id="269" r:id="rId7"/>
     <p:sldId id="270" r:id="rId8"/>
     <p:sldId id="271" r:id="rId9"/>
-    <p:sldId id="273" r:id="rId10"/>
-    <p:sldId id="274" r:id="rId11"/>
+    <p:sldId id="274" r:id="rId10"/>
+    <p:sldId id="273" r:id="rId11"/>
     <p:sldId id="272" r:id="rId12"/>
     <p:sldId id="261" r:id="rId13"/>
     <p:sldId id="266" r:id="rId14"/>
@@ -652,11 +652,7 @@
             </a:pPr>
             <a:r>
               <a:rPr kumimoji="1" lang="en-US" altLang="ja-JP" dirty="0"/>
-              <a:t>Overview of </a:t>
-            </a:r>
-            <a:r>
-              <a:rPr kumimoji="1" lang="en-US" altLang="ja-JP"/>
-              <a:t>python testing space.</a:t>
+              <a:t>Overview of python testing space.</a:t>
             </a:r>
           </a:p>
           <a:p>
@@ -5186,14 +5182,19 @@
             <p:ph type="title"/>
           </p:nvPr>
         </p:nvSpPr>
-        <p:spPr/>
+        <p:spPr>
+          <a:xfrm>
+            <a:off x="838200" y="0"/>
+            <a:ext cx="10515600" cy="1325563"/>
+          </a:xfrm>
+        </p:spPr>
         <p:txBody>
           <a:bodyPr/>
           <a:lstStyle/>
           <a:p>
             <a:r>
               <a:rPr kumimoji="1" lang="en-US" altLang="ja-JP" dirty="0"/>
-              <a:t>Test Coverage</a:t>
+              <a:t>Testing Strategies</a:t>
             </a:r>
             <a:endParaRPr kumimoji="1" lang="ja-JP" altLang="en-US" dirty="0"/>
           </a:p>
@@ -5215,123 +5216,148 @@
             <p:ph idx="1"/>
           </p:nvPr>
         </p:nvSpPr>
-        <p:spPr/>
+        <p:spPr>
+          <a:xfrm>
+            <a:off x="838200" y="1224501"/>
+            <a:ext cx="10515600" cy="5390984"/>
+          </a:xfrm>
+        </p:spPr>
         <p:txBody>
-          <a:bodyPr/>
+          <a:bodyPr>
+            <a:normAutofit fontScale="62500" lnSpcReduction="20000"/>
+          </a:bodyPr>
           <a:lstStyle/>
           <a:p>
             <a:r>
               <a:rPr lang="en-US" altLang="ja-JP" dirty="0"/>
-              <a:t>Doesn’t tell you whether test suite is good, just how much app code you hit.</a:t>
+              <a:t>Totally architecture-dependent. User-visible features usually a good place to start.</a:t>
             </a:r>
           </a:p>
           <a:p>
             <a:r>
               <a:rPr lang="en-US" altLang="ja-JP" dirty="0"/>
-              <a:t>Can inspect coverage with </a:t>
-            </a:r>
-            <a:r>
-              <a:rPr lang="en-US" altLang="ja-JP" dirty="0">
-                <a:hlinkClick r:id="rId2"/>
-              </a:rPr>
-              <a:t>Coverage.py</a:t>
-            </a:r>
+              <a:t>Consider: security, performance, loading, input validation, etc.</a:t>
+            </a:r>
+          </a:p>
+          <a:p>
             <a:r>
               <a:rPr lang="en-US" altLang="ja-JP" dirty="0"/>
-              <a:t> and </a:t>
-            </a:r>
-            <a:r>
-              <a:rPr lang="en-US" altLang="ja-JP" dirty="0" err="1">
-                <a:hlinkClick r:id="rId3"/>
-              </a:rPr>
-              <a:t>pytest-cov</a:t>
-            </a:r>
+              <a:t>Test by app layer (UI/API/DB/etc.).</a:t>
+            </a:r>
+          </a:p>
+          <a:p>
+            <a:pPr lvl="1"/>
             <a:r>
               <a:rPr lang="en-US" altLang="ja-JP" dirty="0"/>
-              <a:t>.</a:t>
+              <a:t>Here, UI/DB are thin to isolate dependencies, and so that testing API gives more bang for buck.</a:t>
             </a:r>
           </a:p>
           <a:p>
             <a:r>
               <a:rPr lang="en-US" altLang="ja-JP" dirty="0"/>
-              <a:t>`</a:t>
-            </a:r>
-            <a:r>
-              <a:rPr lang="en-US" altLang="ja-JP" dirty="0" err="1"/>
-              <a:t>pytest</a:t>
-            </a:r>
+              <a:t>Test by category:</a:t>
+            </a:r>
+          </a:p>
+          <a:p>
+            <a:pPr lvl="1"/>
             <a:r>
               <a:rPr lang="en-US" altLang="ja-JP" dirty="0"/>
-              <a:t> --</a:t>
-            </a:r>
-            <a:r>
-              <a:rPr lang="en-US" altLang="ja-JP" dirty="0" err="1"/>
-              <a:t>cov</a:t>
-            </a:r>
+              <a:t>Recent - new features/fixes/refactors/etc.</a:t>
+            </a:r>
+          </a:p>
+          <a:p>
+            <a:pPr lvl="1"/>
             <a:r>
               <a:rPr lang="en-US" altLang="ja-JP" dirty="0"/>
-              <a:t>="</a:t>
-            </a:r>
-            <a:r>
-              <a:rPr lang="en-US" altLang="ja-JP" dirty="0" err="1"/>
-              <a:t>dir</a:t>
-            </a:r>
+              <a:t>Core - things that must work for product to be useful.</a:t>
+            </a:r>
+          </a:p>
+          <a:p>
+            <a:pPr lvl="1"/>
             <a:r>
               <a:rPr lang="en-US" altLang="ja-JP" dirty="0"/>
-              <a:t>"`</a:t>
-            </a:r>
-          </a:p>
-          <a:p>
+              <a:t>Risk - perhaps like third-party code .</a:t>
+            </a:r>
+          </a:p>
+          <a:p>
+            <a:pPr lvl="1"/>
             <a:r>
               <a:rPr lang="en-US" altLang="ja-JP" dirty="0"/>
-              <a:t>`</a:t>
-            </a:r>
-            <a:r>
-              <a:rPr lang="en-US" altLang="ja-JP" dirty="0" err="1"/>
-              <a:t>pytest</a:t>
-            </a:r>
+              <a:t>Problematic - things that frequently break or get bug reports.</a:t>
+            </a:r>
+          </a:p>
+          <a:p>
+            <a:pPr lvl="1"/>
             <a:r>
               <a:rPr lang="en-US" altLang="ja-JP" dirty="0"/>
-              <a:t> --</a:t>
-            </a:r>
-            <a:r>
-              <a:rPr lang="en-US" altLang="ja-JP" dirty="0" err="1"/>
-              <a:t>cov</a:t>
-            </a:r>
+              <a:t>Expertise - features/algos only understood by a few people.</a:t>
+            </a:r>
+          </a:p>
+          <a:p>
             <a:r>
               <a:rPr lang="en-US" altLang="ja-JP" dirty="0"/>
-              <a:t>="</a:t>
-            </a:r>
-            <a:r>
-              <a:rPr lang="en-US" altLang="ja-JP" dirty="0" err="1"/>
-              <a:t>dir</a:t>
-            </a:r>
+              <a:t>Initial test cases:</a:t>
+            </a:r>
+          </a:p>
+          <a:p>
+            <a:pPr lvl="1"/>
             <a:r>
               <a:rPr lang="en-US" altLang="ja-JP" dirty="0"/>
-              <a:t>" --</a:t>
-            </a:r>
-            <a:r>
-              <a:rPr lang="en-US" altLang="ja-JP" dirty="0" err="1"/>
-              <a:t>cov</a:t>
-            </a:r>
+              <a:t>Happy path</a:t>
+            </a:r>
+          </a:p>
+          <a:p>
+            <a:pPr lvl="1"/>
             <a:r>
               <a:rPr lang="en-US" altLang="ja-JP" dirty="0"/>
-              <a:t>-report=html`</a:t>
-            </a:r>
-          </a:p>
-          <a:p>
+              <a:t>Interesting input sets</a:t>
+            </a:r>
+          </a:p>
+          <a:p>
+            <a:pPr lvl="1"/>
             <a:r>
               <a:rPr lang="en-US" altLang="ja-JP" dirty="0"/>
-              <a:t>Beware of coverage-driven development.</a:t>
-            </a:r>
-            <a:endParaRPr kumimoji="1" lang="en-US" altLang="ja-JP" dirty="0"/>
+              <a:t>Interesting starting states</a:t>
+            </a:r>
+          </a:p>
+          <a:p>
+            <a:pPr lvl="1"/>
+            <a:r>
+              <a:rPr lang="en-US" altLang="ja-JP" dirty="0"/>
+              <a:t>Interesting ending states</a:t>
+            </a:r>
+          </a:p>
+          <a:p>
+            <a:pPr lvl="1"/>
+            <a:r>
+              <a:rPr lang="en-US" altLang="ja-JP" dirty="0"/>
+              <a:t>Possible error states</a:t>
+            </a:r>
+          </a:p>
+          <a:p>
+            <a:r>
+              <a:rPr lang="en-US" altLang="ja-JP" dirty="0"/>
+              <a:t>Write explicit strategy and list cases before writing test code.</a:t>
+            </a:r>
+          </a:p>
+          <a:p>
+            <a:r>
+              <a:rPr lang="en-US" altLang="ja-JP" dirty="0"/>
+              <a:t>Document bugfixes with tests.</a:t>
+            </a:r>
+          </a:p>
+          <a:p>
+            <a:r>
+              <a:rPr lang="en-US" altLang="ja-JP" dirty="0"/>
+              <a:t>Test enough to sleep soundly at night.</a:t>
+            </a:r>
           </a:p>
         </p:txBody>
       </p:sp>
     </p:spTree>
     <p:extLst>
       <p:ext uri="{BB962C8B-B14F-4D97-AF65-F5344CB8AC3E}">
-        <p14:creationId xmlns:p14="http://schemas.microsoft.com/office/powerpoint/2010/main" val="494099320"/>
+        <p14:creationId xmlns:p14="http://schemas.microsoft.com/office/powerpoint/2010/main" val="1462606093"/>
       </p:ext>
     </p:extLst>
   </p:cSld>
@@ -5487,33 +5513,15 @@
                                   </p:childTnLst>
                                 </p:cTn>
                               </p:par>
-                            </p:childTnLst>
-                          </p:cTn>
-                        </p:par>
-                      </p:childTnLst>
-                    </p:cTn>
-                  </p:par>
-                  <p:par>
-                    <p:cTn id="15" fill="hold">
-                      <p:stCondLst>
-                        <p:cond delay="indefinite"/>
-                      </p:stCondLst>
-                      <p:childTnLst>
-                        <p:par>
-                          <p:cTn id="16" fill="hold">
-                            <p:stCondLst>
-                              <p:cond delay="0"/>
-                            </p:stCondLst>
-                            <p:childTnLst>
                               <p:par>
-                                <p:cTn id="17" presetID="1" presetClass="entr" presetSubtype="0" fill="hold" grpId="0" nodeType="clickEffect">
+                                <p:cTn id="15" presetID="1" presetClass="entr" presetSubtype="0" fill="hold" grpId="0" nodeType="withEffect">
                                   <p:stCondLst>
                                     <p:cond delay="0"/>
                                   </p:stCondLst>
                                   <p:childTnLst>
                                     <p:set>
                                       <p:cBhvr>
-                                        <p:cTn id="18" dur="1" fill="hold">
+                                        <p:cTn id="16" dur="1" fill="hold">
                                           <p:stCondLst>
                                             <p:cond delay="0"/>
                                           </p:stCondLst>
@@ -5543,19 +5551,50 @@
                     </p:cTn>
                   </p:par>
                   <p:par>
-                    <p:cTn id="19" fill="hold">
+                    <p:cTn id="17" fill="hold">
                       <p:stCondLst>
                         <p:cond delay="indefinite"/>
                       </p:stCondLst>
                       <p:childTnLst>
                         <p:par>
-                          <p:cTn id="20" fill="hold">
+                          <p:cTn id="18" fill="hold">
                             <p:stCondLst>
                               <p:cond delay="0"/>
                             </p:stCondLst>
                             <p:childTnLst>
                               <p:par>
-                                <p:cTn id="21" presetID="1" presetClass="entr" presetSubtype="0" fill="hold" grpId="0" nodeType="clickEffect">
+                                <p:cTn id="19" presetID="1" presetClass="entr" presetSubtype="0" fill="hold" grpId="0" nodeType="clickEffect">
+                                  <p:stCondLst>
+                                    <p:cond delay="0"/>
+                                  </p:stCondLst>
+                                  <p:childTnLst>
+                                    <p:set>
+                                      <p:cBhvr>
+                                        <p:cTn id="20" dur="1" fill="hold">
+                                          <p:stCondLst>
+                                            <p:cond delay="0"/>
+                                          </p:stCondLst>
+                                        </p:cTn>
+                                        <p:tgtEl>
+                                          <p:spTgt spid="3">
+                                            <p:txEl>
+                                              <p:pRg st="4" end="4"/>
+                                            </p:txEl>
+                                          </p:spTgt>
+                                        </p:tgtEl>
+                                        <p:attrNameLst>
+                                          <p:attrName>style.visibility</p:attrName>
+                                        </p:attrNameLst>
+                                      </p:cBhvr>
+                                      <p:to>
+                                        <p:strVal val="visible"/>
+                                      </p:to>
+                                    </p:set>
+                                  </p:childTnLst>
+                                </p:cTn>
+                              </p:par>
+                              <p:par>
+                                <p:cTn id="21" presetID="1" presetClass="entr" presetSubtype="0" fill="hold" grpId="0" nodeType="withEffect">
                                   <p:stCondLst>
                                     <p:cond delay="0"/>
                                   </p:stCondLst>
@@ -5570,7 +5609,482 @@
                                         <p:tgtEl>
                                           <p:spTgt spid="3">
                                             <p:txEl>
-                                              <p:pRg st="4" end="4"/>
+                                              <p:pRg st="5" end="5"/>
+                                            </p:txEl>
+                                          </p:spTgt>
+                                        </p:tgtEl>
+                                        <p:attrNameLst>
+                                          <p:attrName>style.visibility</p:attrName>
+                                        </p:attrNameLst>
+                                      </p:cBhvr>
+                                      <p:to>
+                                        <p:strVal val="visible"/>
+                                      </p:to>
+                                    </p:set>
+                                  </p:childTnLst>
+                                </p:cTn>
+                              </p:par>
+                              <p:par>
+                                <p:cTn id="23" presetID="1" presetClass="entr" presetSubtype="0" fill="hold" grpId="0" nodeType="withEffect">
+                                  <p:stCondLst>
+                                    <p:cond delay="0"/>
+                                  </p:stCondLst>
+                                  <p:childTnLst>
+                                    <p:set>
+                                      <p:cBhvr>
+                                        <p:cTn id="24" dur="1" fill="hold">
+                                          <p:stCondLst>
+                                            <p:cond delay="0"/>
+                                          </p:stCondLst>
+                                        </p:cTn>
+                                        <p:tgtEl>
+                                          <p:spTgt spid="3">
+                                            <p:txEl>
+                                              <p:pRg st="6" end="6"/>
+                                            </p:txEl>
+                                          </p:spTgt>
+                                        </p:tgtEl>
+                                        <p:attrNameLst>
+                                          <p:attrName>style.visibility</p:attrName>
+                                        </p:attrNameLst>
+                                      </p:cBhvr>
+                                      <p:to>
+                                        <p:strVal val="visible"/>
+                                      </p:to>
+                                    </p:set>
+                                  </p:childTnLst>
+                                </p:cTn>
+                              </p:par>
+                              <p:par>
+                                <p:cTn id="25" presetID="1" presetClass="entr" presetSubtype="0" fill="hold" grpId="0" nodeType="withEffect">
+                                  <p:stCondLst>
+                                    <p:cond delay="0"/>
+                                  </p:stCondLst>
+                                  <p:childTnLst>
+                                    <p:set>
+                                      <p:cBhvr>
+                                        <p:cTn id="26" dur="1" fill="hold">
+                                          <p:stCondLst>
+                                            <p:cond delay="0"/>
+                                          </p:stCondLst>
+                                        </p:cTn>
+                                        <p:tgtEl>
+                                          <p:spTgt spid="3">
+                                            <p:txEl>
+                                              <p:pRg st="7" end="7"/>
+                                            </p:txEl>
+                                          </p:spTgt>
+                                        </p:tgtEl>
+                                        <p:attrNameLst>
+                                          <p:attrName>style.visibility</p:attrName>
+                                        </p:attrNameLst>
+                                      </p:cBhvr>
+                                      <p:to>
+                                        <p:strVal val="visible"/>
+                                      </p:to>
+                                    </p:set>
+                                  </p:childTnLst>
+                                </p:cTn>
+                              </p:par>
+                              <p:par>
+                                <p:cTn id="27" presetID="1" presetClass="entr" presetSubtype="0" fill="hold" grpId="0" nodeType="withEffect">
+                                  <p:stCondLst>
+                                    <p:cond delay="0"/>
+                                  </p:stCondLst>
+                                  <p:childTnLst>
+                                    <p:set>
+                                      <p:cBhvr>
+                                        <p:cTn id="28" dur="1" fill="hold">
+                                          <p:stCondLst>
+                                            <p:cond delay="0"/>
+                                          </p:stCondLst>
+                                        </p:cTn>
+                                        <p:tgtEl>
+                                          <p:spTgt spid="3">
+                                            <p:txEl>
+                                              <p:pRg st="8" end="8"/>
+                                            </p:txEl>
+                                          </p:spTgt>
+                                        </p:tgtEl>
+                                        <p:attrNameLst>
+                                          <p:attrName>style.visibility</p:attrName>
+                                        </p:attrNameLst>
+                                      </p:cBhvr>
+                                      <p:to>
+                                        <p:strVal val="visible"/>
+                                      </p:to>
+                                    </p:set>
+                                  </p:childTnLst>
+                                </p:cTn>
+                              </p:par>
+                              <p:par>
+                                <p:cTn id="29" presetID="1" presetClass="entr" presetSubtype="0" fill="hold" grpId="0" nodeType="withEffect">
+                                  <p:stCondLst>
+                                    <p:cond delay="0"/>
+                                  </p:stCondLst>
+                                  <p:childTnLst>
+                                    <p:set>
+                                      <p:cBhvr>
+                                        <p:cTn id="30" dur="1" fill="hold">
+                                          <p:stCondLst>
+                                            <p:cond delay="0"/>
+                                          </p:stCondLst>
+                                        </p:cTn>
+                                        <p:tgtEl>
+                                          <p:spTgt spid="3">
+                                            <p:txEl>
+                                              <p:pRg st="9" end="9"/>
+                                            </p:txEl>
+                                          </p:spTgt>
+                                        </p:tgtEl>
+                                        <p:attrNameLst>
+                                          <p:attrName>style.visibility</p:attrName>
+                                        </p:attrNameLst>
+                                      </p:cBhvr>
+                                      <p:to>
+                                        <p:strVal val="visible"/>
+                                      </p:to>
+                                    </p:set>
+                                  </p:childTnLst>
+                                </p:cTn>
+                              </p:par>
+                            </p:childTnLst>
+                          </p:cTn>
+                        </p:par>
+                      </p:childTnLst>
+                    </p:cTn>
+                  </p:par>
+                  <p:par>
+                    <p:cTn id="31" fill="hold">
+                      <p:stCondLst>
+                        <p:cond delay="indefinite"/>
+                      </p:stCondLst>
+                      <p:childTnLst>
+                        <p:par>
+                          <p:cTn id="32" fill="hold">
+                            <p:stCondLst>
+                              <p:cond delay="0"/>
+                            </p:stCondLst>
+                            <p:childTnLst>
+                              <p:par>
+                                <p:cTn id="33" presetID="1" presetClass="entr" presetSubtype="0" fill="hold" grpId="0" nodeType="clickEffect">
+                                  <p:stCondLst>
+                                    <p:cond delay="0"/>
+                                  </p:stCondLst>
+                                  <p:childTnLst>
+                                    <p:set>
+                                      <p:cBhvr>
+                                        <p:cTn id="34" dur="1" fill="hold">
+                                          <p:stCondLst>
+                                            <p:cond delay="0"/>
+                                          </p:stCondLst>
+                                        </p:cTn>
+                                        <p:tgtEl>
+                                          <p:spTgt spid="3">
+                                            <p:txEl>
+                                              <p:pRg st="10" end="10"/>
+                                            </p:txEl>
+                                          </p:spTgt>
+                                        </p:tgtEl>
+                                        <p:attrNameLst>
+                                          <p:attrName>style.visibility</p:attrName>
+                                        </p:attrNameLst>
+                                      </p:cBhvr>
+                                      <p:to>
+                                        <p:strVal val="visible"/>
+                                      </p:to>
+                                    </p:set>
+                                  </p:childTnLst>
+                                </p:cTn>
+                              </p:par>
+                              <p:par>
+                                <p:cTn id="35" presetID="1" presetClass="entr" presetSubtype="0" fill="hold" grpId="0" nodeType="withEffect">
+                                  <p:stCondLst>
+                                    <p:cond delay="0"/>
+                                  </p:stCondLst>
+                                  <p:childTnLst>
+                                    <p:set>
+                                      <p:cBhvr>
+                                        <p:cTn id="36" dur="1" fill="hold">
+                                          <p:stCondLst>
+                                            <p:cond delay="0"/>
+                                          </p:stCondLst>
+                                        </p:cTn>
+                                        <p:tgtEl>
+                                          <p:spTgt spid="3">
+                                            <p:txEl>
+                                              <p:pRg st="11" end="11"/>
+                                            </p:txEl>
+                                          </p:spTgt>
+                                        </p:tgtEl>
+                                        <p:attrNameLst>
+                                          <p:attrName>style.visibility</p:attrName>
+                                        </p:attrNameLst>
+                                      </p:cBhvr>
+                                      <p:to>
+                                        <p:strVal val="visible"/>
+                                      </p:to>
+                                    </p:set>
+                                  </p:childTnLst>
+                                </p:cTn>
+                              </p:par>
+                              <p:par>
+                                <p:cTn id="37" presetID="1" presetClass="entr" presetSubtype="0" fill="hold" grpId="0" nodeType="withEffect">
+                                  <p:stCondLst>
+                                    <p:cond delay="0"/>
+                                  </p:stCondLst>
+                                  <p:childTnLst>
+                                    <p:set>
+                                      <p:cBhvr>
+                                        <p:cTn id="38" dur="1" fill="hold">
+                                          <p:stCondLst>
+                                            <p:cond delay="0"/>
+                                          </p:stCondLst>
+                                        </p:cTn>
+                                        <p:tgtEl>
+                                          <p:spTgt spid="3">
+                                            <p:txEl>
+                                              <p:pRg st="12" end="12"/>
+                                            </p:txEl>
+                                          </p:spTgt>
+                                        </p:tgtEl>
+                                        <p:attrNameLst>
+                                          <p:attrName>style.visibility</p:attrName>
+                                        </p:attrNameLst>
+                                      </p:cBhvr>
+                                      <p:to>
+                                        <p:strVal val="visible"/>
+                                      </p:to>
+                                    </p:set>
+                                  </p:childTnLst>
+                                </p:cTn>
+                              </p:par>
+                              <p:par>
+                                <p:cTn id="39" presetID="1" presetClass="entr" presetSubtype="0" fill="hold" grpId="0" nodeType="withEffect">
+                                  <p:stCondLst>
+                                    <p:cond delay="0"/>
+                                  </p:stCondLst>
+                                  <p:childTnLst>
+                                    <p:set>
+                                      <p:cBhvr>
+                                        <p:cTn id="40" dur="1" fill="hold">
+                                          <p:stCondLst>
+                                            <p:cond delay="0"/>
+                                          </p:stCondLst>
+                                        </p:cTn>
+                                        <p:tgtEl>
+                                          <p:spTgt spid="3">
+                                            <p:txEl>
+                                              <p:pRg st="13" end="13"/>
+                                            </p:txEl>
+                                          </p:spTgt>
+                                        </p:tgtEl>
+                                        <p:attrNameLst>
+                                          <p:attrName>style.visibility</p:attrName>
+                                        </p:attrNameLst>
+                                      </p:cBhvr>
+                                      <p:to>
+                                        <p:strVal val="visible"/>
+                                      </p:to>
+                                    </p:set>
+                                  </p:childTnLst>
+                                </p:cTn>
+                              </p:par>
+                              <p:par>
+                                <p:cTn id="41" presetID="1" presetClass="entr" presetSubtype="0" fill="hold" grpId="0" nodeType="withEffect">
+                                  <p:stCondLst>
+                                    <p:cond delay="0"/>
+                                  </p:stCondLst>
+                                  <p:childTnLst>
+                                    <p:set>
+                                      <p:cBhvr>
+                                        <p:cTn id="42" dur="1" fill="hold">
+                                          <p:stCondLst>
+                                            <p:cond delay="0"/>
+                                          </p:stCondLst>
+                                        </p:cTn>
+                                        <p:tgtEl>
+                                          <p:spTgt spid="3">
+                                            <p:txEl>
+                                              <p:pRg st="14" end="14"/>
+                                            </p:txEl>
+                                          </p:spTgt>
+                                        </p:tgtEl>
+                                        <p:attrNameLst>
+                                          <p:attrName>style.visibility</p:attrName>
+                                        </p:attrNameLst>
+                                      </p:cBhvr>
+                                      <p:to>
+                                        <p:strVal val="visible"/>
+                                      </p:to>
+                                    </p:set>
+                                  </p:childTnLst>
+                                </p:cTn>
+                              </p:par>
+                              <p:par>
+                                <p:cTn id="43" presetID="1" presetClass="entr" presetSubtype="0" fill="hold" grpId="0" nodeType="withEffect">
+                                  <p:stCondLst>
+                                    <p:cond delay="0"/>
+                                  </p:stCondLst>
+                                  <p:childTnLst>
+                                    <p:set>
+                                      <p:cBhvr>
+                                        <p:cTn id="44" dur="1" fill="hold">
+                                          <p:stCondLst>
+                                            <p:cond delay="0"/>
+                                          </p:stCondLst>
+                                        </p:cTn>
+                                        <p:tgtEl>
+                                          <p:spTgt spid="3">
+                                            <p:txEl>
+                                              <p:pRg st="15" end="15"/>
+                                            </p:txEl>
+                                          </p:spTgt>
+                                        </p:tgtEl>
+                                        <p:attrNameLst>
+                                          <p:attrName>style.visibility</p:attrName>
+                                        </p:attrNameLst>
+                                      </p:cBhvr>
+                                      <p:to>
+                                        <p:strVal val="visible"/>
+                                      </p:to>
+                                    </p:set>
+                                  </p:childTnLst>
+                                </p:cTn>
+                              </p:par>
+                            </p:childTnLst>
+                          </p:cTn>
+                        </p:par>
+                      </p:childTnLst>
+                    </p:cTn>
+                  </p:par>
+                  <p:par>
+                    <p:cTn id="45" fill="hold">
+                      <p:stCondLst>
+                        <p:cond delay="indefinite"/>
+                      </p:stCondLst>
+                      <p:childTnLst>
+                        <p:par>
+                          <p:cTn id="46" fill="hold">
+                            <p:stCondLst>
+                              <p:cond delay="0"/>
+                            </p:stCondLst>
+                            <p:childTnLst>
+                              <p:par>
+                                <p:cTn id="47" presetID="1" presetClass="entr" presetSubtype="0" fill="hold" grpId="0" nodeType="clickEffect">
+                                  <p:stCondLst>
+                                    <p:cond delay="0"/>
+                                  </p:stCondLst>
+                                  <p:childTnLst>
+                                    <p:set>
+                                      <p:cBhvr>
+                                        <p:cTn id="48" dur="1" fill="hold">
+                                          <p:stCondLst>
+                                            <p:cond delay="0"/>
+                                          </p:stCondLst>
+                                        </p:cTn>
+                                        <p:tgtEl>
+                                          <p:spTgt spid="3">
+                                            <p:txEl>
+                                              <p:pRg st="16" end="16"/>
+                                            </p:txEl>
+                                          </p:spTgt>
+                                        </p:tgtEl>
+                                        <p:attrNameLst>
+                                          <p:attrName>style.visibility</p:attrName>
+                                        </p:attrNameLst>
+                                      </p:cBhvr>
+                                      <p:to>
+                                        <p:strVal val="visible"/>
+                                      </p:to>
+                                    </p:set>
+                                  </p:childTnLst>
+                                </p:cTn>
+                              </p:par>
+                            </p:childTnLst>
+                          </p:cTn>
+                        </p:par>
+                      </p:childTnLst>
+                    </p:cTn>
+                  </p:par>
+                  <p:par>
+                    <p:cTn id="49" fill="hold">
+                      <p:stCondLst>
+                        <p:cond delay="indefinite"/>
+                      </p:stCondLst>
+                      <p:childTnLst>
+                        <p:par>
+                          <p:cTn id="50" fill="hold">
+                            <p:stCondLst>
+                              <p:cond delay="0"/>
+                            </p:stCondLst>
+                            <p:childTnLst>
+                              <p:par>
+                                <p:cTn id="51" presetID="1" presetClass="entr" presetSubtype="0" fill="hold" grpId="0" nodeType="clickEffect">
+                                  <p:stCondLst>
+                                    <p:cond delay="0"/>
+                                  </p:stCondLst>
+                                  <p:childTnLst>
+                                    <p:set>
+                                      <p:cBhvr>
+                                        <p:cTn id="52" dur="1" fill="hold">
+                                          <p:stCondLst>
+                                            <p:cond delay="0"/>
+                                          </p:stCondLst>
+                                        </p:cTn>
+                                        <p:tgtEl>
+                                          <p:spTgt spid="3">
+                                            <p:txEl>
+                                              <p:pRg st="17" end="17"/>
+                                            </p:txEl>
+                                          </p:spTgt>
+                                        </p:tgtEl>
+                                        <p:attrNameLst>
+                                          <p:attrName>style.visibility</p:attrName>
+                                        </p:attrNameLst>
+                                      </p:cBhvr>
+                                      <p:to>
+                                        <p:strVal val="visible"/>
+                                      </p:to>
+                                    </p:set>
+                                  </p:childTnLst>
+                                </p:cTn>
+                              </p:par>
+                            </p:childTnLst>
+                          </p:cTn>
+                        </p:par>
+                      </p:childTnLst>
+                    </p:cTn>
+                  </p:par>
+                  <p:par>
+                    <p:cTn id="53" fill="hold">
+                      <p:stCondLst>
+                        <p:cond delay="indefinite"/>
+                      </p:stCondLst>
+                      <p:childTnLst>
+                        <p:par>
+                          <p:cTn id="54" fill="hold">
+                            <p:stCondLst>
+                              <p:cond delay="0"/>
+                            </p:stCondLst>
+                            <p:childTnLst>
+                              <p:par>
+                                <p:cTn id="55" presetID="1" presetClass="entr" presetSubtype="0" fill="hold" grpId="0" nodeType="clickEffect">
+                                  <p:stCondLst>
+                                    <p:cond delay="0"/>
+                                  </p:stCondLst>
+                                  <p:childTnLst>
+                                    <p:set>
+                                      <p:cBhvr>
+                                        <p:cTn id="56" dur="1" fill="hold">
+                                          <p:stCondLst>
+                                            <p:cond delay="0"/>
+                                          </p:stCondLst>
+                                        </p:cTn>
+                                        <p:tgtEl>
+                                          <p:spTgt spid="3">
+                                            <p:txEl>
+                                              <p:pRg st="18" end="18"/>
                                             </p:txEl>
                                           </p:spTgt>
                                         </p:tgtEl>
@@ -9723,19 +10237,14 @@
             <p:ph type="title"/>
           </p:nvPr>
         </p:nvSpPr>
-        <p:spPr>
-          <a:xfrm>
-            <a:off x="838200" y="0"/>
-            <a:ext cx="10515600" cy="1325563"/>
-          </a:xfrm>
-        </p:spPr>
+        <p:spPr/>
         <p:txBody>
           <a:bodyPr/>
           <a:lstStyle/>
           <a:p>
             <a:r>
               <a:rPr kumimoji="1" lang="en-US" altLang="ja-JP" dirty="0"/>
-              <a:t>Testing Strategies</a:t>
+              <a:t>Test Coverage</a:t>
             </a:r>
             <a:endParaRPr kumimoji="1" lang="ja-JP" altLang="en-US" dirty="0"/>
           </a:p>
@@ -9757,148 +10266,123 @@
             <p:ph idx="1"/>
           </p:nvPr>
         </p:nvSpPr>
-        <p:spPr>
-          <a:xfrm>
-            <a:off x="838200" y="1224501"/>
-            <a:ext cx="10515600" cy="5390984"/>
-          </a:xfrm>
-        </p:spPr>
+        <p:spPr/>
         <p:txBody>
-          <a:bodyPr>
-            <a:normAutofit fontScale="62500" lnSpcReduction="20000"/>
-          </a:bodyPr>
+          <a:bodyPr/>
           <a:lstStyle/>
           <a:p>
             <a:r>
               <a:rPr lang="en-US" altLang="ja-JP" dirty="0"/>
-              <a:t>Totally architecture-dependent. User-visible features usually a good place to start.</a:t>
+              <a:t>Doesn’t tell you whether test suite is good, just how much app code you hit.</a:t>
             </a:r>
           </a:p>
           <a:p>
             <a:r>
               <a:rPr lang="en-US" altLang="ja-JP" dirty="0"/>
-              <a:t>Consider: security, performance, loading, input validation, etc.</a:t>
-            </a:r>
-          </a:p>
-          <a:p>
+              <a:t>Can inspect coverage with </a:t>
+            </a:r>
+            <a:r>
+              <a:rPr lang="en-US" altLang="ja-JP" dirty="0">
+                <a:hlinkClick r:id="rId2"/>
+              </a:rPr>
+              <a:t>Coverage.py</a:t>
+            </a:r>
             <a:r>
               <a:rPr lang="en-US" altLang="ja-JP" dirty="0"/>
-              <a:t>Test by app layer (UI/API/DB/etc.).</a:t>
-            </a:r>
-          </a:p>
-          <a:p>
-            <a:pPr lvl="1"/>
+              <a:t> and </a:t>
+            </a:r>
+            <a:r>
+              <a:rPr lang="en-US" altLang="ja-JP" dirty="0" err="1">
+                <a:hlinkClick r:id="rId3"/>
+              </a:rPr>
+              <a:t>pytest-cov</a:t>
+            </a:r>
             <a:r>
               <a:rPr lang="en-US" altLang="ja-JP" dirty="0"/>
-              <a:t>Here, UI/DB are thin to isolate dependencies, and so that testing API gives more bang for buck.</a:t>
+              <a:t>.</a:t>
             </a:r>
           </a:p>
           <a:p>
             <a:r>
               <a:rPr lang="en-US" altLang="ja-JP" dirty="0"/>
-              <a:t>Test by category:</a:t>
-            </a:r>
-          </a:p>
-          <a:p>
-            <a:pPr lvl="1"/>
+              <a:t>`</a:t>
+            </a:r>
+            <a:r>
+              <a:rPr lang="en-US" altLang="ja-JP" dirty="0" err="1"/>
+              <a:t>pytest</a:t>
+            </a:r>
             <a:r>
               <a:rPr lang="en-US" altLang="ja-JP" dirty="0"/>
-              <a:t>Recent - new features/fixes/refactors/etc.</a:t>
-            </a:r>
-          </a:p>
-          <a:p>
-            <a:pPr lvl="1"/>
+              <a:t> --</a:t>
+            </a:r>
+            <a:r>
+              <a:rPr lang="en-US" altLang="ja-JP" dirty="0" err="1"/>
+              <a:t>cov</a:t>
+            </a:r>
             <a:r>
               <a:rPr lang="en-US" altLang="ja-JP" dirty="0"/>
-              <a:t>Core - things that must work for product to be useful.</a:t>
-            </a:r>
-          </a:p>
-          <a:p>
-            <a:pPr lvl="1"/>
+              <a:t>="</a:t>
+            </a:r>
+            <a:r>
+              <a:rPr lang="en-US" altLang="ja-JP" dirty="0" err="1"/>
+              <a:t>dir</a:t>
+            </a:r>
             <a:r>
               <a:rPr lang="en-US" altLang="ja-JP" dirty="0"/>
-              <a:t>Risk - perhaps like third-party code .</a:t>
-            </a:r>
-          </a:p>
-          <a:p>
-            <a:pPr lvl="1"/>
+              <a:t>"`</a:t>
+            </a:r>
+          </a:p>
+          <a:p>
             <a:r>
               <a:rPr lang="en-US" altLang="ja-JP" dirty="0"/>
-              <a:t>Problematic - things that frequently break or get bug reports.</a:t>
-            </a:r>
-          </a:p>
-          <a:p>
-            <a:pPr lvl="1"/>
+              <a:t>`</a:t>
+            </a:r>
+            <a:r>
+              <a:rPr lang="en-US" altLang="ja-JP" dirty="0" err="1"/>
+              <a:t>pytest</a:t>
+            </a:r>
             <a:r>
               <a:rPr lang="en-US" altLang="ja-JP" dirty="0"/>
-              <a:t>Expertise - features/algos only understood by a few people.</a:t>
-            </a:r>
-          </a:p>
-          <a:p>
+              <a:t> --</a:t>
+            </a:r>
+            <a:r>
+              <a:rPr lang="en-US" altLang="ja-JP" dirty="0" err="1"/>
+              <a:t>cov</a:t>
+            </a:r>
             <a:r>
               <a:rPr lang="en-US" altLang="ja-JP" dirty="0"/>
-              <a:t>Initial test cases:</a:t>
-            </a:r>
-          </a:p>
-          <a:p>
-            <a:pPr lvl="1"/>
+              <a:t>="</a:t>
+            </a:r>
+            <a:r>
+              <a:rPr lang="en-US" altLang="ja-JP" dirty="0" err="1"/>
+              <a:t>dir</a:t>
+            </a:r>
             <a:r>
               <a:rPr lang="en-US" altLang="ja-JP" dirty="0"/>
-              <a:t>Happy path</a:t>
-            </a:r>
-          </a:p>
-          <a:p>
-            <a:pPr lvl="1"/>
+              <a:t>" --</a:t>
+            </a:r>
+            <a:r>
+              <a:rPr lang="en-US" altLang="ja-JP" dirty="0" err="1"/>
+              <a:t>cov</a:t>
+            </a:r>
             <a:r>
               <a:rPr lang="en-US" altLang="ja-JP" dirty="0"/>
-              <a:t>Interesting input sets</a:t>
-            </a:r>
-          </a:p>
-          <a:p>
-            <a:pPr lvl="1"/>
+              <a:t>-report=html`</a:t>
+            </a:r>
+          </a:p>
+          <a:p>
             <a:r>
               <a:rPr lang="en-US" altLang="ja-JP" dirty="0"/>
-              <a:t>Interesting starting states</a:t>
-            </a:r>
-          </a:p>
-          <a:p>
-            <a:pPr lvl="1"/>
-            <a:r>
-              <a:rPr lang="en-US" altLang="ja-JP" dirty="0"/>
-              <a:t>Interesting ending states</a:t>
-            </a:r>
-          </a:p>
-          <a:p>
-            <a:pPr lvl="1"/>
-            <a:r>
-              <a:rPr lang="en-US" altLang="ja-JP" dirty="0"/>
-              <a:t>Possible error states</a:t>
-            </a:r>
-          </a:p>
-          <a:p>
-            <a:r>
-              <a:rPr lang="en-US" altLang="ja-JP" dirty="0"/>
-              <a:t>Write explicit strategy and list cases before writing test code.</a:t>
-            </a:r>
-          </a:p>
-          <a:p>
-            <a:r>
-              <a:rPr lang="en-US" altLang="ja-JP" dirty="0"/>
-              <a:t>Document bugfixes with tests.</a:t>
-            </a:r>
-          </a:p>
-          <a:p>
-            <a:r>
-              <a:rPr lang="en-US" altLang="ja-JP" dirty="0"/>
-              <a:t>Test enough to sleep soundly at night.</a:t>
-            </a:r>
+              <a:t>Beware of coverage-driven development.</a:t>
+            </a:r>
+            <a:endParaRPr kumimoji="1" lang="en-US" altLang="ja-JP" dirty="0"/>
           </a:p>
         </p:txBody>
       </p:sp>
     </p:spTree>
     <p:extLst>
       <p:ext uri="{BB962C8B-B14F-4D97-AF65-F5344CB8AC3E}">
-        <p14:creationId xmlns:p14="http://schemas.microsoft.com/office/powerpoint/2010/main" val="1462606093"/>
+        <p14:creationId xmlns:p14="http://schemas.microsoft.com/office/powerpoint/2010/main" val="494099320"/>
       </p:ext>
     </p:extLst>
   </p:cSld>
@@ -10054,15 +10538,33 @@
                                   </p:childTnLst>
                                 </p:cTn>
                               </p:par>
+                            </p:childTnLst>
+                          </p:cTn>
+                        </p:par>
+                      </p:childTnLst>
+                    </p:cTn>
+                  </p:par>
+                  <p:par>
+                    <p:cTn id="15" fill="hold">
+                      <p:stCondLst>
+                        <p:cond delay="indefinite"/>
+                      </p:stCondLst>
+                      <p:childTnLst>
+                        <p:par>
+                          <p:cTn id="16" fill="hold">
+                            <p:stCondLst>
+                              <p:cond delay="0"/>
+                            </p:stCondLst>
+                            <p:childTnLst>
                               <p:par>
-                                <p:cTn id="15" presetID="1" presetClass="entr" presetSubtype="0" fill="hold" grpId="0" nodeType="withEffect">
+                                <p:cTn id="17" presetID="1" presetClass="entr" presetSubtype="0" fill="hold" grpId="0" nodeType="clickEffect">
                                   <p:stCondLst>
                                     <p:cond delay="0"/>
                                   </p:stCondLst>
                                   <p:childTnLst>
                                     <p:set>
                                       <p:cBhvr>
-                                        <p:cTn id="16" dur="1" fill="hold">
+                                        <p:cTn id="18" dur="1" fill="hold">
                                           <p:stCondLst>
                                             <p:cond delay="0"/>
                                           </p:stCondLst>
@@ -10092,50 +10594,19 @@
                     </p:cTn>
                   </p:par>
                   <p:par>
-                    <p:cTn id="17" fill="hold">
+                    <p:cTn id="19" fill="hold">
                       <p:stCondLst>
                         <p:cond delay="indefinite"/>
                       </p:stCondLst>
                       <p:childTnLst>
                         <p:par>
-                          <p:cTn id="18" fill="hold">
+                          <p:cTn id="20" fill="hold">
                             <p:stCondLst>
                               <p:cond delay="0"/>
                             </p:stCondLst>
                             <p:childTnLst>
                               <p:par>
-                                <p:cTn id="19" presetID="1" presetClass="entr" presetSubtype="0" fill="hold" grpId="0" nodeType="clickEffect">
-                                  <p:stCondLst>
-                                    <p:cond delay="0"/>
-                                  </p:stCondLst>
-                                  <p:childTnLst>
-                                    <p:set>
-                                      <p:cBhvr>
-                                        <p:cTn id="20" dur="1" fill="hold">
-                                          <p:stCondLst>
-                                            <p:cond delay="0"/>
-                                          </p:stCondLst>
-                                        </p:cTn>
-                                        <p:tgtEl>
-                                          <p:spTgt spid="3">
-                                            <p:txEl>
-                                              <p:pRg st="4" end="4"/>
-                                            </p:txEl>
-                                          </p:spTgt>
-                                        </p:tgtEl>
-                                        <p:attrNameLst>
-                                          <p:attrName>style.visibility</p:attrName>
-                                        </p:attrNameLst>
-                                      </p:cBhvr>
-                                      <p:to>
-                                        <p:strVal val="visible"/>
-                                      </p:to>
-                                    </p:set>
-                                  </p:childTnLst>
-                                </p:cTn>
-                              </p:par>
-                              <p:par>
-                                <p:cTn id="21" presetID="1" presetClass="entr" presetSubtype="0" fill="hold" grpId="0" nodeType="withEffect">
+                                <p:cTn id="21" presetID="1" presetClass="entr" presetSubtype="0" fill="hold" grpId="0" nodeType="clickEffect">
                                   <p:stCondLst>
                                     <p:cond delay="0"/>
                                   </p:stCondLst>
@@ -10150,482 +10621,7 @@
                                         <p:tgtEl>
                                           <p:spTgt spid="3">
                                             <p:txEl>
-                                              <p:pRg st="5" end="5"/>
-                                            </p:txEl>
-                                          </p:spTgt>
-                                        </p:tgtEl>
-                                        <p:attrNameLst>
-                                          <p:attrName>style.visibility</p:attrName>
-                                        </p:attrNameLst>
-                                      </p:cBhvr>
-                                      <p:to>
-                                        <p:strVal val="visible"/>
-                                      </p:to>
-                                    </p:set>
-                                  </p:childTnLst>
-                                </p:cTn>
-                              </p:par>
-                              <p:par>
-                                <p:cTn id="23" presetID="1" presetClass="entr" presetSubtype="0" fill="hold" grpId="0" nodeType="withEffect">
-                                  <p:stCondLst>
-                                    <p:cond delay="0"/>
-                                  </p:stCondLst>
-                                  <p:childTnLst>
-                                    <p:set>
-                                      <p:cBhvr>
-                                        <p:cTn id="24" dur="1" fill="hold">
-                                          <p:stCondLst>
-                                            <p:cond delay="0"/>
-                                          </p:stCondLst>
-                                        </p:cTn>
-                                        <p:tgtEl>
-                                          <p:spTgt spid="3">
-                                            <p:txEl>
-                                              <p:pRg st="6" end="6"/>
-                                            </p:txEl>
-                                          </p:spTgt>
-                                        </p:tgtEl>
-                                        <p:attrNameLst>
-                                          <p:attrName>style.visibility</p:attrName>
-                                        </p:attrNameLst>
-                                      </p:cBhvr>
-                                      <p:to>
-                                        <p:strVal val="visible"/>
-                                      </p:to>
-                                    </p:set>
-                                  </p:childTnLst>
-                                </p:cTn>
-                              </p:par>
-                              <p:par>
-                                <p:cTn id="25" presetID="1" presetClass="entr" presetSubtype="0" fill="hold" grpId="0" nodeType="withEffect">
-                                  <p:stCondLst>
-                                    <p:cond delay="0"/>
-                                  </p:stCondLst>
-                                  <p:childTnLst>
-                                    <p:set>
-                                      <p:cBhvr>
-                                        <p:cTn id="26" dur="1" fill="hold">
-                                          <p:stCondLst>
-                                            <p:cond delay="0"/>
-                                          </p:stCondLst>
-                                        </p:cTn>
-                                        <p:tgtEl>
-                                          <p:spTgt spid="3">
-                                            <p:txEl>
-                                              <p:pRg st="7" end="7"/>
-                                            </p:txEl>
-                                          </p:spTgt>
-                                        </p:tgtEl>
-                                        <p:attrNameLst>
-                                          <p:attrName>style.visibility</p:attrName>
-                                        </p:attrNameLst>
-                                      </p:cBhvr>
-                                      <p:to>
-                                        <p:strVal val="visible"/>
-                                      </p:to>
-                                    </p:set>
-                                  </p:childTnLst>
-                                </p:cTn>
-                              </p:par>
-                              <p:par>
-                                <p:cTn id="27" presetID="1" presetClass="entr" presetSubtype="0" fill="hold" grpId="0" nodeType="withEffect">
-                                  <p:stCondLst>
-                                    <p:cond delay="0"/>
-                                  </p:stCondLst>
-                                  <p:childTnLst>
-                                    <p:set>
-                                      <p:cBhvr>
-                                        <p:cTn id="28" dur="1" fill="hold">
-                                          <p:stCondLst>
-                                            <p:cond delay="0"/>
-                                          </p:stCondLst>
-                                        </p:cTn>
-                                        <p:tgtEl>
-                                          <p:spTgt spid="3">
-                                            <p:txEl>
-                                              <p:pRg st="8" end="8"/>
-                                            </p:txEl>
-                                          </p:spTgt>
-                                        </p:tgtEl>
-                                        <p:attrNameLst>
-                                          <p:attrName>style.visibility</p:attrName>
-                                        </p:attrNameLst>
-                                      </p:cBhvr>
-                                      <p:to>
-                                        <p:strVal val="visible"/>
-                                      </p:to>
-                                    </p:set>
-                                  </p:childTnLst>
-                                </p:cTn>
-                              </p:par>
-                              <p:par>
-                                <p:cTn id="29" presetID="1" presetClass="entr" presetSubtype="0" fill="hold" grpId="0" nodeType="withEffect">
-                                  <p:stCondLst>
-                                    <p:cond delay="0"/>
-                                  </p:stCondLst>
-                                  <p:childTnLst>
-                                    <p:set>
-                                      <p:cBhvr>
-                                        <p:cTn id="30" dur="1" fill="hold">
-                                          <p:stCondLst>
-                                            <p:cond delay="0"/>
-                                          </p:stCondLst>
-                                        </p:cTn>
-                                        <p:tgtEl>
-                                          <p:spTgt spid="3">
-                                            <p:txEl>
-                                              <p:pRg st="9" end="9"/>
-                                            </p:txEl>
-                                          </p:spTgt>
-                                        </p:tgtEl>
-                                        <p:attrNameLst>
-                                          <p:attrName>style.visibility</p:attrName>
-                                        </p:attrNameLst>
-                                      </p:cBhvr>
-                                      <p:to>
-                                        <p:strVal val="visible"/>
-                                      </p:to>
-                                    </p:set>
-                                  </p:childTnLst>
-                                </p:cTn>
-                              </p:par>
-                            </p:childTnLst>
-                          </p:cTn>
-                        </p:par>
-                      </p:childTnLst>
-                    </p:cTn>
-                  </p:par>
-                  <p:par>
-                    <p:cTn id="31" fill="hold">
-                      <p:stCondLst>
-                        <p:cond delay="indefinite"/>
-                      </p:stCondLst>
-                      <p:childTnLst>
-                        <p:par>
-                          <p:cTn id="32" fill="hold">
-                            <p:stCondLst>
-                              <p:cond delay="0"/>
-                            </p:stCondLst>
-                            <p:childTnLst>
-                              <p:par>
-                                <p:cTn id="33" presetID="1" presetClass="entr" presetSubtype="0" fill="hold" grpId="0" nodeType="clickEffect">
-                                  <p:stCondLst>
-                                    <p:cond delay="0"/>
-                                  </p:stCondLst>
-                                  <p:childTnLst>
-                                    <p:set>
-                                      <p:cBhvr>
-                                        <p:cTn id="34" dur="1" fill="hold">
-                                          <p:stCondLst>
-                                            <p:cond delay="0"/>
-                                          </p:stCondLst>
-                                        </p:cTn>
-                                        <p:tgtEl>
-                                          <p:spTgt spid="3">
-                                            <p:txEl>
-                                              <p:pRg st="10" end="10"/>
-                                            </p:txEl>
-                                          </p:spTgt>
-                                        </p:tgtEl>
-                                        <p:attrNameLst>
-                                          <p:attrName>style.visibility</p:attrName>
-                                        </p:attrNameLst>
-                                      </p:cBhvr>
-                                      <p:to>
-                                        <p:strVal val="visible"/>
-                                      </p:to>
-                                    </p:set>
-                                  </p:childTnLst>
-                                </p:cTn>
-                              </p:par>
-                              <p:par>
-                                <p:cTn id="35" presetID="1" presetClass="entr" presetSubtype="0" fill="hold" grpId="0" nodeType="withEffect">
-                                  <p:stCondLst>
-                                    <p:cond delay="0"/>
-                                  </p:stCondLst>
-                                  <p:childTnLst>
-                                    <p:set>
-                                      <p:cBhvr>
-                                        <p:cTn id="36" dur="1" fill="hold">
-                                          <p:stCondLst>
-                                            <p:cond delay="0"/>
-                                          </p:stCondLst>
-                                        </p:cTn>
-                                        <p:tgtEl>
-                                          <p:spTgt spid="3">
-                                            <p:txEl>
-                                              <p:pRg st="11" end="11"/>
-                                            </p:txEl>
-                                          </p:spTgt>
-                                        </p:tgtEl>
-                                        <p:attrNameLst>
-                                          <p:attrName>style.visibility</p:attrName>
-                                        </p:attrNameLst>
-                                      </p:cBhvr>
-                                      <p:to>
-                                        <p:strVal val="visible"/>
-                                      </p:to>
-                                    </p:set>
-                                  </p:childTnLst>
-                                </p:cTn>
-                              </p:par>
-                              <p:par>
-                                <p:cTn id="37" presetID="1" presetClass="entr" presetSubtype="0" fill="hold" grpId="0" nodeType="withEffect">
-                                  <p:stCondLst>
-                                    <p:cond delay="0"/>
-                                  </p:stCondLst>
-                                  <p:childTnLst>
-                                    <p:set>
-                                      <p:cBhvr>
-                                        <p:cTn id="38" dur="1" fill="hold">
-                                          <p:stCondLst>
-                                            <p:cond delay="0"/>
-                                          </p:stCondLst>
-                                        </p:cTn>
-                                        <p:tgtEl>
-                                          <p:spTgt spid="3">
-                                            <p:txEl>
-                                              <p:pRg st="12" end="12"/>
-                                            </p:txEl>
-                                          </p:spTgt>
-                                        </p:tgtEl>
-                                        <p:attrNameLst>
-                                          <p:attrName>style.visibility</p:attrName>
-                                        </p:attrNameLst>
-                                      </p:cBhvr>
-                                      <p:to>
-                                        <p:strVal val="visible"/>
-                                      </p:to>
-                                    </p:set>
-                                  </p:childTnLst>
-                                </p:cTn>
-                              </p:par>
-                              <p:par>
-                                <p:cTn id="39" presetID="1" presetClass="entr" presetSubtype="0" fill="hold" grpId="0" nodeType="withEffect">
-                                  <p:stCondLst>
-                                    <p:cond delay="0"/>
-                                  </p:stCondLst>
-                                  <p:childTnLst>
-                                    <p:set>
-                                      <p:cBhvr>
-                                        <p:cTn id="40" dur="1" fill="hold">
-                                          <p:stCondLst>
-                                            <p:cond delay="0"/>
-                                          </p:stCondLst>
-                                        </p:cTn>
-                                        <p:tgtEl>
-                                          <p:spTgt spid="3">
-                                            <p:txEl>
-                                              <p:pRg st="13" end="13"/>
-                                            </p:txEl>
-                                          </p:spTgt>
-                                        </p:tgtEl>
-                                        <p:attrNameLst>
-                                          <p:attrName>style.visibility</p:attrName>
-                                        </p:attrNameLst>
-                                      </p:cBhvr>
-                                      <p:to>
-                                        <p:strVal val="visible"/>
-                                      </p:to>
-                                    </p:set>
-                                  </p:childTnLst>
-                                </p:cTn>
-                              </p:par>
-                              <p:par>
-                                <p:cTn id="41" presetID="1" presetClass="entr" presetSubtype="0" fill="hold" grpId="0" nodeType="withEffect">
-                                  <p:stCondLst>
-                                    <p:cond delay="0"/>
-                                  </p:stCondLst>
-                                  <p:childTnLst>
-                                    <p:set>
-                                      <p:cBhvr>
-                                        <p:cTn id="42" dur="1" fill="hold">
-                                          <p:stCondLst>
-                                            <p:cond delay="0"/>
-                                          </p:stCondLst>
-                                        </p:cTn>
-                                        <p:tgtEl>
-                                          <p:spTgt spid="3">
-                                            <p:txEl>
-                                              <p:pRg st="14" end="14"/>
-                                            </p:txEl>
-                                          </p:spTgt>
-                                        </p:tgtEl>
-                                        <p:attrNameLst>
-                                          <p:attrName>style.visibility</p:attrName>
-                                        </p:attrNameLst>
-                                      </p:cBhvr>
-                                      <p:to>
-                                        <p:strVal val="visible"/>
-                                      </p:to>
-                                    </p:set>
-                                  </p:childTnLst>
-                                </p:cTn>
-                              </p:par>
-                              <p:par>
-                                <p:cTn id="43" presetID="1" presetClass="entr" presetSubtype="0" fill="hold" grpId="0" nodeType="withEffect">
-                                  <p:stCondLst>
-                                    <p:cond delay="0"/>
-                                  </p:stCondLst>
-                                  <p:childTnLst>
-                                    <p:set>
-                                      <p:cBhvr>
-                                        <p:cTn id="44" dur="1" fill="hold">
-                                          <p:stCondLst>
-                                            <p:cond delay="0"/>
-                                          </p:stCondLst>
-                                        </p:cTn>
-                                        <p:tgtEl>
-                                          <p:spTgt spid="3">
-                                            <p:txEl>
-                                              <p:pRg st="15" end="15"/>
-                                            </p:txEl>
-                                          </p:spTgt>
-                                        </p:tgtEl>
-                                        <p:attrNameLst>
-                                          <p:attrName>style.visibility</p:attrName>
-                                        </p:attrNameLst>
-                                      </p:cBhvr>
-                                      <p:to>
-                                        <p:strVal val="visible"/>
-                                      </p:to>
-                                    </p:set>
-                                  </p:childTnLst>
-                                </p:cTn>
-                              </p:par>
-                            </p:childTnLst>
-                          </p:cTn>
-                        </p:par>
-                      </p:childTnLst>
-                    </p:cTn>
-                  </p:par>
-                  <p:par>
-                    <p:cTn id="45" fill="hold">
-                      <p:stCondLst>
-                        <p:cond delay="indefinite"/>
-                      </p:stCondLst>
-                      <p:childTnLst>
-                        <p:par>
-                          <p:cTn id="46" fill="hold">
-                            <p:stCondLst>
-                              <p:cond delay="0"/>
-                            </p:stCondLst>
-                            <p:childTnLst>
-                              <p:par>
-                                <p:cTn id="47" presetID="1" presetClass="entr" presetSubtype="0" fill="hold" grpId="0" nodeType="clickEffect">
-                                  <p:stCondLst>
-                                    <p:cond delay="0"/>
-                                  </p:stCondLst>
-                                  <p:childTnLst>
-                                    <p:set>
-                                      <p:cBhvr>
-                                        <p:cTn id="48" dur="1" fill="hold">
-                                          <p:stCondLst>
-                                            <p:cond delay="0"/>
-                                          </p:stCondLst>
-                                        </p:cTn>
-                                        <p:tgtEl>
-                                          <p:spTgt spid="3">
-                                            <p:txEl>
-                                              <p:pRg st="16" end="16"/>
-                                            </p:txEl>
-                                          </p:spTgt>
-                                        </p:tgtEl>
-                                        <p:attrNameLst>
-                                          <p:attrName>style.visibility</p:attrName>
-                                        </p:attrNameLst>
-                                      </p:cBhvr>
-                                      <p:to>
-                                        <p:strVal val="visible"/>
-                                      </p:to>
-                                    </p:set>
-                                  </p:childTnLst>
-                                </p:cTn>
-                              </p:par>
-                            </p:childTnLst>
-                          </p:cTn>
-                        </p:par>
-                      </p:childTnLst>
-                    </p:cTn>
-                  </p:par>
-                  <p:par>
-                    <p:cTn id="49" fill="hold">
-                      <p:stCondLst>
-                        <p:cond delay="indefinite"/>
-                      </p:stCondLst>
-                      <p:childTnLst>
-                        <p:par>
-                          <p:cTn id="50" fill="hold">
-                            <p:stCondLst>
-                              <p:cond delay="0"/>
-                            </p:stCondLst>
-                            <p:childTnLst>
-                              <p:par>
-                                <p:cTn id="51" presetID="1" presetClass="entr" presetSubtype="0" fill="hold" grpId="0" nodeType="clickEffect">
-                                  <p:stCondLst>
-                                    <p:cond delay="0"/>
-                                  </p:stCondLst>
-                                  <p:childTnLst>
-                                    <p:set>
-                                      <p:cBhvr>
-                                        <p:cTn id="52" dur="1" fill="hold">
-                                          <p:stCondLst>
-                                            <p:cond delay="0"/>
-                                          </p:stCondLst>
-                                        </p:cTn>
-                                        <p:tgtEl>
-                                          <p:spTgt spid="3">
-                                            <p:txEl>
-                                              <p:pRg st="17" end="17"/>
-                                            </p:txEl>
-                                          </p:spTgt>
-                                        </p:tgtEl>
-                                        <p:attrNameLst>
-                                          <p:attrName>style.visibility</p:attrName>
-                                        </p:attrNameLst>
-                                      </p:cBhvr>
-                                      <p:to>
-                                        <p:strVal val="visible"/>
-                                      </p:to>
-                                    </p:set>
-                                  </p:childTnLst>
-                                </p:cTn>
-                              </p:par>
-                            </p:childTnLst>
-                          </p:cTn>
-                        </p:par>
-                      </p:childTnLst>
-                    </p:cTn>
-                  </p:par>
-                  <p:par>
-                    <p:cTn id="53" fill="hold">
-                      <p:stCondLst>
-                        <p:cond delay="indefinite"/>
-                      </p:stCondLst>
-                      <p:childTnLst>
-                        <p:par>
-                          <p:cTn id="54" fill="hold">
-                            <p:stCondLst>
-                              <p:cond delay="0"/>
-                            </p:stCondLst>
-                            <p:childTnLst>
-                              <p:par>
-                                <p:cTn id="55" presetID="1" presetClass="entr" presetSubtype="0" fill="hold" grpId="0" nodeType="clickEffect">
-                                  <p:stCondLst>
-                                    <p:cond delay="0"/>
-                                  </p:stCondLst>
-                                  <p:childTnLst>
-                                    <p:set>
-                                      <p:cBhvr>
-                                        <p:cTn id="56" dur="1" fill="hold">
-                                          <p:stCondLst>
-                                            <p:cond delay="0"/>
-                                          </p:stCondLst>
-                                        </p:cTn>
-                                        <p:tgtEl>
-                                          <p:spTgt spid="3">
-                                            <p:txEl>
-                                              <p:pRg st="18" end="18"/>
+                                              <p:pRg st="4" end="4"/>
                                             </p:txEl>
                                           </p:spTgt>
                                         </p:tgtEl>

</xml_diff>